<commit_message>
documentation for the code
</commit_message>
<xml_diff>
--- a/Documents/xodr_changes_in_code.pptx
+++ b/Documents/xodr_changes_in_code.pptx
@@ -6,7 +6,15 @@
   </p:sldMasterIdLst>
   <p:sldIdLst>
     <p:sldId id="256" r:id="rId2"/>
-    <p:sldId id="257" r:id="rId3"/>
+    <p:sldId id="260" r:id="rId3"/>
+    <p:sldId id="257" r:id="rId4"/>
+    <p:sldId id="258" r:id="rId5"/>
+    <p:sldId id="259" r:id="rId6"/>
+    <p:sldId id="261" r:id="rId7"/>
+    <p:sldId id="262" r:id="rId8"/>
+    <p:sldId id="263" r:id="rId9"/>
+    <p:sldId id="264" r:id="rId10"/>
+    <p:sldId id="265" r:id="rId11"/>
   </p:sldIdLst>
   <p:sldSz cx="12192000" cy="6858000"/>
   <p:notesSz cx="6858000" cy="9144000"/>
@@ -105,6 +113,11 @@
       </a:defRPr>
     </a:lvl9pPr>
   </p:defaultTextStyle>
+  <p:extLst>
+    <p:ext uri="{EFAFB233-063F-42B5-8137-9DF3F51BA10A}">
+      <p15:sldGuideLst xmlns:p15="http://schemas.microsoft.com/office/powerpoint/2012/main"/>
+    </p:ext>
+  </p:extLst>
 </p:presentation>
 </file>
 
@@ -3400,6 +3413,135 @@
 </p:sld>
 </file>
 
+<file path=ppt/slides/slide10.xml><?xml version="1.0" encoding="utf-8"?>
+<p:sld xmlns:a="http://schemas.openxmlformats.org/drawingml/2006/main" xmlns:r="http://schemas.openxmlformats.org/officeDocument/2006/relationships" xmlns:p="http://schemas.openxmlformats.org/presentationml/2006/main">
+  <p:cSld>
+    <p:spTree>
+      <p:nvGrpSpPr>
+        <p:cNvPr id="1" name=""/>
+        <p:cNvGrpSpPr/>
+        <p:nvPr/>
+      </p:nvGrpSpPr>
+      <p:grpSpPr>
+        <a:xfrm>
+          <a:off x="0" y="0"/>
+          <a:ext cx="0" cy="0"/>
+          <a:chOff x="0" y="0"/>
+          <a:chExt cx="0" cy="0"/>
+        </a:xfrm>
+      </p:grpSpPr>
+      <p:pic>
+        <p:nvPicPr>
+          <p:cNvPr id="5" name="Picture 4" descr="A picture containing text&#10;&#10;Description automatically generated">
+            <a:extLst>
+              <a:ext uri="{FF2B5EF4-FFF2-40B4-BE49-F238E27FC236}">
+                <a16:creationId xmlns:a16="http://schemas.microsoft.com/office/drawing/2014/main" id="{192EC143-8205-FEF8-8C83-DAE7F72802F7}"/>
+              </a:ext>
+            </a:extLst>
+          </p:cNvPr>
+          <p:cNvPicPr>
+            <a:picLocks noChangeAspect="1"/>
+          </p:cNvPicPr>
+          <p:nvPr/>
+        </p:nvPicPr>
+        <p:blipFill>
+          <a:blip r:embed="rId2"/>
+          <a:stretch>
+            <a:fillRect/>
+          </a:stretch>
+        </p:blipFill>
+        <p:spPr>
+          <a:xfrm>
+            <a:off x="546100" y="193675"/>
+            <a:ext cx="11099800" cy="1498600"/>
+          </a:xfrm>
+          <a:prstGeom prst="rect">
+            <a:avLst/>
+          </a:prstGeom>
+        </p:spPr>
+      </p:pic>
+      <p:sp>
+        <p:nvSpPr>
+          <p:cNvPr id="6" name="TextBox 5">
+            <a:extLst>
+              <a:ext uri="{FF2B5EF4-FFF2-40B4-BE49-F238E27FC236}">
+                <a16:creationId xmlns:a16="http://schemas.microsoft.com/office/drawing/2014/main" id="{AF87C8FD-252B-8FA4-B992-9D5CB9FF38A2}"/>
+              </a:ext>
+            </a:extLst>
+          </p:cNvPr>
+          <p:cNvSpPr txBox="1"/>
+          <p:nvPr/>
+        </p:nvSpPr>
+        <p:spPr>
+          <a:xfrm>
+            <a:off x="614363" y="2143125"/>
+            <a:ext cx="3057375" cy="1200329"/>
+          </a:xfrm>
+          <a:prstGeom prst="rect">
+            <a:avLst/>
+          </a:prstGeom>
+          <a:noFill/>
+        </p:spPr>
+        <p:txBody>
+          <a:bodyPr wrap="none" rtlCol="0">
+            <a:spAutoFit/>
+          </a:bodyPr>
+          <a:lstStyle/>
+          <a:p>
+            <a:pPr marL="285750" indent="-285750">
+              <a:buFontTx/>
+              <a:buChar char="-"/>
+            </a:pPr>
+            <a:r>
+              <a:rPr lang="en-US" dirty="0"/>
+              <a:t>The Center lane is unique</a:t>
+            </a:r>
+          </a:p>
+          <a:p>
+            <a:pPr marL="285750" indent="-285750">
+              <a:buFontTx/>
+              <a:buChar char="-"/>
+            </a:pPr>
+            <a:r>
+              <a:rPr lang="en-US" dirty="0"/>
+              <a:t>Type needs to be solid solid</a:t>
+            </a:r>
+          </a:p>
+          <a:p>
+            <a:pPr marL="285750" indent="-285750">
+              <a:buFontTx/>
+              <a:buChar char="-"/>
+            </a:pPr>
+            <a:r>
+              <a:rPr lang="en-US" dirty="0"/>
+              <a:t>Color needs to be yellow</a:t>
+            </a:r>
+          </a:p>
+          <a:p>
+            <a:pPr marL="285750" indent="-285750">
+              <a:buFontTx/>
+              <a:buChar char="-"/>
+            </a:pPr>
+            <a:r>
+              <a:rPr lang="en-US" dirty="0"/>
+              <a:t>Width needs to be 0.125</a:t>
+            </a:r>
+          </a:p>
+        </p:txBody>
+      </p:sp>
+    </p:spTree>
+    <p:extLst>
+      <p:ext uri="{BB962C8B-B14F-4D97-AF65-F5344CB8AC3E}">
+        <p14:creationId xmlns:p14="http://schemas.microsoft.com/office/powerpoint/2010/main" val="3899169685"/>
+      </p:ext>
+    </p:extLst>
+  </p:cSld>
+  <p:clrMapOvr>
+    <a:masterClrMapping/>
+  </p:clrMapOvr>
+</p:sld>
+</file>
+
 <file path=ppt/slides/slide2.xml><?xml version="1.0" encoding="utf-8"?>
 <p:sld xmlns:a="http://schemas.openxmlformats.org/drawingml/2006/main" xmlns:r="http://schemas.openxmlformats.org/officeDocument/2006/relationships" xmlns:p="http://schemas.openxmlformats.org/presentationml/2006/main">
   <p:cSld>
@@ -3417,53 +3559,210 @@
           <a:chExt cx="0" cy="0"/>
         </a:xfrm>
       </p:grpSpPr>
-      <p:sp>
-        <p:nvSpPr>
-          <p:cNvPr id="2" name="Title 1">
-            <a:extLst>
-              <a:ext uri="{FF2B5EF4-FFF2-40B4-BE49-F238E27FC236}">
-                <a16:creationId xmlns:a16="http://schemas.microsoft.com/office/drawing/2014/main" id="{79F72523-7618-24AB-0308-67BD454B008F}"/>
-              </a:ext>
-            </a:extLst>
-          </p:cNvPr>
-          <p:cNvSpPr>
-            <a:spLocks noGrp="1"/>
-          </p:cNvSpPr>
-          <p:nvPr>
-            <p:ph type="title"/>
-          </p:nvPr>
-        </p:nvSpPr>
-        <p:spPr/>
-        <p:txBody>
-          <a:bodyPr/>
-          <a:lstStyle/>
-          <a:p>
-            <a:endParaRPr lang="en-US"/>
-          </a:p>
-        </p:txBody>
-      </p:sp>
-      <p:sp>
-        <p:nvSpPr>
-          <p:cNvPr id="3" name="Content Placeholder 2">
-            <a:extLst>
-              <a:ext uri="{FF2B5EF4-FFF2-40B4-BE49-F238E27FC236}">
-                <a16:creationId xmlns:a16="http://schemas.microsoft.com/office/drawing/2014/main" id="{8FAC494F-4958-C6DE-CE51-DD00D1CC4C12}"/>
-              </a:ext>
-            </a:extLst>
-          </p:cNvPr>
-          <p:cNvSpPr>
-            <a:spLocks noGrp="1"/>
-          </p:cNvSpPr>
-          <p:nvPr>
-            <p:ph idx="1"/>
-          </p:nvPr>
-        </p:nvSpPr>
-        <p:spPr/>
-        <p:txBody>
-          <a:bodyPr/>
-          <a:lstStyle/>
-          <a:p>
-            <a:endParaRPr lang="en-US"/>
+      <p:pic>
+        <p:nvPicPr>
+          <p:cNvPr id="5" name="Picture 4" descr="A picture containing text&#10;&#10;Description automatically generated">
+            <a:extLst>
+              <a:ext uri="{FF2B5EF4-FFF2-40B4-BE49-F238E27FC236}">
+                <a16:creationId xmlns:a16="http://schemas.microsoft.com/office/drawing/2014/main" id="{C7218EC2-6471-0BEF-6BC4-773CFDD5093D}"/>
+              </a:ext>
+            </a:extLst>
+          </p:cNvPr>
+          <p:cNvPicPr>
+            <a:picLocks noChangeAspect="1"/>
+          </p:cNvPicPr>
+          <p:nvPr/>
+        </p:nvPicPr>
+        <p:blipFill>
+          <a:blip r:embed="rId2"/>
+          <a:stretch>
+            <a:fillRect/>
+          </a:stretch>
+        </p:blipFill>
+        <p:spPr>
+          <a:xfrm>
+            <a:off x="4197350" y="864870"/>
+            <a:ext cx="3797300" cy="533400"/>
+          </a:xfrm>
+          <a:prstGeom prst="rect">
+            <a:avLst/>
+          </a:prstGeom>
+        </p:spPr>
+      </p:pic>
+      <p:sp>
+        <p:nvSpPr>
+          <p:cNvPr id="6" name="TextBox 5">
+            <a:extLst>
+              <a:ext uri="{FF2B5EF4-FFF2-40B4-BE49-F238E27FC236}">
+                <a16:creationId xmlns:a16="http://schemas.microsoft.com/office/drawing/2014/main" id="{EB4E04E4-E96C-6D74-BC8D-6266B5CC98A0}"/>
+              </a:ext>
+            </a:extLst>
+          </p:cNvPr>
+          <p:cNvSpPr txBox="1"/>
+          <p:nvPr/>
+        </p:nvSpPr>
+        <p:spPr>
+          <a:xfrm>
+            <a:off x="1476498" y="2651760"/>
+            <a:ext cx="9239004" cy="369332"/>
+          </a:xfrm>
+          <a:prstGeom prst="rect">
+            <a:avLst/>
+          </a:prstGeom>
+          <a:noFill/>
+        </p:spPr>
+        <p:txBody>
+          <a:bodyPr wrap="none" rtlCol="0">
+            <a:spAutoFit/>
+          </a:bodyPr>
+          <a:lstStyle/>
+          <a:p>
+            <a:r>
+              <a:rPr lang="en-US" dirty="0"/>
+              <a:t>- Specify the format of numbers as %e which will express number as exponent and decimal places</a:t>
+            </a:r>
+          </a:p>
+        </p:txBody>
+      </p:sp>
+    </p:spTree>
+    <p:extLst>
+      <p:ext uri="{BB962C8B-B14F-4D97-AF65-F5344CB8AC3E}">
+        <p14:creationId xmlns:p14="http://schemas.microsoft.com/office/powerpoint/2010/main" val="4051556926"/>
+      </p:ext>
+    </p:extLst>
+  </p:cSld>
+  <p:clrMapOvr>
+    <a:masterClrMapping/>
+  </p:clrMapOvr>
+</p:sld>
+</file>
+
+<file path=ppt/slides/slide3.xml><?xml version="1.0" encoding="utf-8"?>
+<p:sld xmlns:a="http://schemas.openxmlformats.org/drawingml/2006/main" xmlns:r="http://schemas.openxmlformats.org/officeDocument/2006/relationships" xmlns:p="http://schemas.openxmlformats.org/presentationml/2006/main">
+  <p:cSld>
+    <p:spTree>
+      <p:nvGrpSpPr>
+        <p:cNvPr id="1" name=""/>
+        <p:cNvGrpSpPr/>
+        <p:nvPr/>
+      </p:nvGrpSpPr>
+      <p:grpSpPr>
+        <a:xfrm>
+          <a:off x="0" y="0"/>
+          <a:ext cx="0" cy="0"/>
+          <a:chOff x="0" y="0"/>
+          <a:chExt cx="0" cy="0"/>
+        </a:xfrm>
+      </p:grpSpPr>
+      <p:pic>
+        <p:nvPicPr>
+          <p:cNvPr id="5" name="Picture 4" descr="Text&#10;&#10;Description automatically generated">
+            <a:extLst>
+              <a:ext uri="{FF2B5EF4-FFF2-40B4-BE49-F238E27FC236}">
+                <a16:creationId xmlns:a16="http://schemas.microsoft.com/office/drawing/2014/main" id="{E5398A0B-B0C0-DCDD-9861-6249C31DFCF9}"/>
+              </a:ext>
+            </a:extLst>
+          </p:cNvPr>
+          <p:cNvPicPr>
+            <a:picLocks noChangeAspect="1"/>
+          </p:cNvPicPr>
+          <p:nvPr/>
+        </p:nvPicPr>
+        <p:blipFill>
+          <a:blip r:embed="rId2"/>
+          <a:stretch>
+            <a:fillRect/>
+          </a:stretch>
+        </p:blipFill>
+        <p:spPr>
+          <a:xfrm>
+            <a:off x="1149350" y="574993"/>
+            <a:ext cx="9664700" cy="1473200"/>
+          </a:xfrm>
+          <a:prstGeom prst="rect">
+            <a:avLst/>
+          </a:prstGeom>
+        </p:spPr>
+      </p:pic>
+      <p:sp>
+        <p:nvSpPr>
+          <p:cNvPr id="6" name="TextBox 5">
+            <a:extLst>
+              <a:ext uri="{FF2B5EF4-FFF2-40B4-BE49-F238E27FC236}">
+                <a16:creationId xmlns:a16="http://schemas.microsoft.com/office/drawing/2014/main" id="{14C32370-5893-E9F3-8F3E-F4F7DEE41FF1}"/>
+              </a:ext>
+            </a:extLst>
+          </p:cNvPr>
+          <p:cNvSpPr txBox="1"/>
+          <p:nvPr/>
+        </p:nvSpPr>
+        <p:spPr>
+          <a:xfrm>
+            <a:off x="1085850" y="2891790"/>
+            <a:ext cx="8388707" cy="1200329"/>
+          </a:xfrm>
+          <a:prstGeom prst="rect">
+            <a:avLst/>
+          </a:prstGeom>
+          <a:noFill/>
+        </p:spPr>
+        <p:txBody>
+          <a:bodyPr wrap="none" rtlCol="0">
+            <a:spAutoFit/>
+          </a:bodyPr>
+          <a:lstStyle/>
+          <a:p>
+            <a:pPr marL="285750" indent="-285750">
+              <a:buFontTx/>
+              <a:buChar char="-"/>
+            </a:pPr>
+            <a:r>
+              <a:rPr lang="en-US" dirty="0"/>
+              <a:t>The version of </a:t>
+            </a:r>
+            <a:r>
+              <a:rPr lang="en-US" dirty="0" err="1"/>
+              <a:t>revMinor</a:t>
+            </a:r>
+            <a:r>
+              <a:rPr lang="en-US" dirty="0"/>
+              <a:t> needs to be changed to 4 because RR 2020 supports up to 4</a:t>
+            </a:r>
+          </a:p>
+          <a:p>
+            <a:pPr marL="285750" indent="-285750">
+              <a:buFontTx/>
+              <a:buChar char="-"/>
+            </a:pPr>
+            <a:r>
+              <a:rPr lang="en-US" dirty="0"/>
+              <a:t>Added the program element which the value is </a:t>
+            </a:r>
+            <a:r>
+              <a:rPr lang="en-US" dirty="0" err="1"/>
+              <a:t>RoadRunner</a:t>
+            </a:r>
+            <a:endParaRPr lang="en-US" dirty="0"/>
+          </a:p>
+          <a:p>
+            <a:pPr marL="285750" indent="-285750">
+              <a:buFontTx/>
+              <a:buChar char="-"/>
+            </a:pPr>
+            <a:r>
+              <a:rPr lang="en-US" dirty="0"/>
+              <a:t>Added the version element which the value is R2022a Update 1 (1.4.1.c40ee10fc8)</a:t>
+            </a:r>
+          </a:p>
+          <a:p>
+            <a:pPr marL="285750" indent="-285750">
+              <a:buFontTx/>
+              <a:buChar char="-"/>
+            </a:pPr>
+            <a:r>
+              <a:rPr lang="en-US" dirty="0"/>
+              <a:t>Added the name element</a:t>
+            </a:r>
           </a:p>
         </p:txBody>
       </p:sp>
@@ -3471,6 +3770,843 @@
     <p:extLst>
       <p:ext uri="{BB962C8B-B14F-4D97-AF65-F5344CB8AC3E}">
         <p14:creationId xmlns:p14="http://schemas.microsoft.com/office/powerpoint/2010/main" val="2930737287"/>
+      </p:ext>
+    </p:extLst>
+  </p:cSld>
+  <p:clrMapOvr>
+    <a:masterClrMapping/>
+  </p:clrMapOvr>
+</p:sld>
+</file>
+
+<file path=ppt/slides/slide4.xml><?xml version="1.0" encoding="utf-8"?>
+<p:sld xmlns:a="http://schemas.openxmlformats.org/drawingml/2006/main" xmlns:r="http://schemas.openxmlformats.org/officeDocument/2006/relationships" xmlns:p="http://schemas.openxmlformats.org/presentationml/2006/main">
+  <p:cSld>
+    <p:spTree>
+      <p:nvGrpSpPr>
+        <p:cNvPr id="1" name=""/>
+        <p:cNvGrpSpPr/>
+        <p:nvPr/>
+      </p:nvGrpSpPr>
+      <p:grpSpPr>
+        <a:xfrm>
+          <a:off x="0" y="0"/>
+          <a:ext cx="0" cy="0"/>
+          <a:chOff x="0" y="0"/>
+          <a:chExt cx="0" cy="0"/>
+        </a:xfrm>
+      </p:grpSpPr>
+      <p:pic>
+        <p:nvPicPr>
+          <p:cNvPr id="5" name="Picture 4" descr="Graphical user interface, text, application&#10;&#10;Description automatically generated">
+            <a:extLst>
+              <a:ext uri="{FF2B5EF4-FFF2-40B4-BE49-F238E27FC236}">
+                <a16:creationId xmlns:a16="http://schemas.microsoft.com/office/drawing/2014/main" id="{02CDD857-9DEA-E4BE-8989-84F75248BBCF}"/>
+              </a:ext>
+            </a:extLst>
+          </p:cNvPr>
+          <p:cNvPicPr>
+            <a:picLocks noChangeAspect="1"/>
+          </p:cNvPicPr>
+          <p:nvPr/>
+        </p:nvPicPr>
+        <p:blipFill>
+          <a:blip r:embed="rId2"/>
+          <a:stretch>
+            <a:fillRect/>
+          </a:stretch>
+        </p:blipFill>
+        <p:spPr>
+          <a:xfrm>
+            <a:off x="3524250" y="962342"/>
+            <a:ext cx="5143500" cy="1270000"/>
+          </a:xfrm>
+          <a:prstGeom prst="rect">
+            <a:avLst/>
+          </a:prstGeom>
+        </p:spPr>
+      </p:pic>
+      <p:sp>
+        <p:nvSpPr>
+          <p:cNvPr id="6" name="TextBox 5">
+            <a:extLst>
+              <a:ext uri="{FF2B5EF4-FFF2-40B4-BE49-F238E27FC236}">
+                <a16:creationId xmlns:a16="http://schemas.microsoft.com/office/drawing/2014/main" id="{C0FA5A21-9F15-798C-DFC9-505437DFC417}"/>
+              </a:ext>
+            </a:extLst>
+          </p:cNvPr>
+          <p:cNvSpPr txBox="1"/>
+          <p:nvPr/>
+        </p:nvSpPr>
+        <p:spPr>
+          <a:xfrm>
+            <a:off x="720090" y="3669030"/>
+            <a:ext cx="10869514" cy="369332"/>
+          </a:xfrm>
+          <a:prstGeom prst="rect">
+            <a:avLst/>
+          </a:prstGeom>
+          <a:noFill/>
+        </p:spPr>
+        <p:txBody>
+          <a:bodyPr wrap="none" rtlCol="0">
+            <a:spAutoFit/>
+          </a:bodyPr>
+          <a:lstStyle/>
+          <a:p>
+            <a:pPr marL="285750" indent="-285750">
+              <a:buFontTx/>
+              <a:buChar char="-"/>
+            </a:pPr>
+            <a:r>
+              <a:rPr lang="en-US" dirty="0"/>
+              <a:t>Added user input asking for the type of road, speed limit, and unit limit because we need these tags in </a:t>
+            </a:r>
+            <a:r>
+              <a:rPr lang="en-US" dirty="0" err="1"/>
+              <a:t>xodr</a:t>
+            </a:r>
+            <a:r>
+              <a:rPr lang="en-US" dirty="0"/>
+              <a:t> file</a:t>
+            </a:r>
+          </a:p>
+        </p:txBody>
+      </p:sp>
+    </p:spTree>
+    <p:extLst>
+      <p:ext uri="{BB962C8B-B14F-4D97-AF65-F5344CB8AC3E}">
+        <p14:creationId xmlns:p14="http://schemas.microsoft.com/office/powerpoint/2010/main" val="3895008681"/>
+      </p:ext>
+    </p:extLst>
+  </p:cSld>
+  <p:clrMapOvr>
+    <a:masterClrMapping/>
+  </p:clrMapOvr>
+</p:sld>
+</file>
+
+<file path=ppt/slides/slide5.xml><?xml version="1.0" encoding="utf-8"?>
+<p:sld xmlns:a="http://schemas.openxmlformats.org/drawingml/2006/main" xmlns:r="http://schemas.openxmlformats.org/officeDocument/2006/relationships" xmlns:p="http://schemas.openxmlformats.org/presentationml/2006/main">
+  <p:cSld>
+    <p:spTree>
+      <p:nvGrpSpPr>
+        <p:cNvPr id="1" name=""/>
+        <p:cNvGrpSpPr/>
+        <p:nvPr/>
+      </p:nvGrpSpPr>
+      <p:grpSpPr>
+        <a:xfrm>
+          <a:off x="0" y="0"/>
+          <a:ext cx="0" cy="0"/>
+          <a:chOff x="0" y="0"/>
+          <a:chExt cx="0" cy="0"/>
+        </a:xfrm>
+      </p:grpSpPr>
+      <p:pic>
+        <p:nvPicPr>
+          <p:cNvPr id="5" name="Picture 4" descr="Text&#10;&#10;Description automatically generated">
+            <a:extLst>
+              <a:ext uri="{FF2B5EF4-FFF2-40B4-BE49-F238E27FC236}">
+                <a16:creationId xmlns:a16="http://schemas.microsoft.com/office/drawing/2014/main" id="{AFB0A3AD-79DB-C575-9F4E-463B5EE1B248}"/>
+              </a:ext>
+            </a:extLst>
+          </p:cNvPr>
+          <p:cNvPicPr>
+            <a:picLocks noChangeAspect="1"/>
+          </p:cNvPicPr>
+          <p:nvPr/>
+        </p:nvPicPr>
+        <p:blipFill>
+          <a:blip r:embed="rId2"/>
+          <a:stretch>
+            <a:fillRect/>
+          </a:stretch>
+        </p:blipFill>
+        <p:spPr>
+          <a:xfrm>
+            <a:off x="1219200" y="433705"/>
+            <a:ext cx="9753600" cy="1841500"/>
+          </a:xfrm>
+          <a:prstGeom prst="rect">
+            <a:avLst/>
+          </a:prstGeom>
+        </p:spPr>
+      </p:pic>
+      <p:sp>
+        <p:nvSpPr>
+          <p:cNvPr id="6" name="TextBox 5">
+            <a:extLst>
+              <a:ext uri="{FF2B5EF4-FFF2-40B4-BE49-F238E27FC236}">
+                <a16:creationId xmlns:a16="http://schemas.microsoft.com/office/drawing/2014/main" id="{016C616C-7502-8EAE-1114-804DB499F2B9}"/>
+              </a:ext>
+            </a:extLst>
+          </p:cNvPr>
+          <p:cNvSpPr txBox="1"/>
+          <p:nvPr/>
+        </p:nvSpPr>
+        <p:spPr>
+          <a:xfrm>
+            <a:off x="1257300" y="3357563"/>
+            <a:ext cx="7329955" cy="2308324"/>
+          </a:xfrm>
+          <a:prstGeom prst="rect">
+            <a:avLst/>
+          </a:prstGeom>
+          <a:noFill/>
+        </p:spPr>
+        <p:txBody>
+          <a:bodyPr wrap="none" rtlCol="0">
+            <a:spAutoFit/>
+          </a:bodyPr>
+          <a:lstStyle/>
+          <a:p>
+            <a:pPr marL="285750" indent="-285750">
+              <a:buFontTx/>
+              <a:buChar char="-"/>
+            </a:pPr>
+            <a:r>
+              <a:rPr lang="en-US" dirty="0"/>
+              <a:t>Added s attributes in the road tag. Using the value 0 according to RR </a:t>
+            </a:r>
+            <a:r>
+              <a:rPr lang="en-US" dirty="0" err="1"/>
+              <a:t>xodr</a:t>
+            </a:r>
+            <a:endParaRPr lang="en-US" dirty="0"/>
+          </a:p>
+          <a:p>
+            <a:pPr marL="285750" indent="-285750">
+              <a:buFontTx/>
+              <a:buChar char="-"/>
+            </a:pPr>
+            <a:r>
+              <a:rPr lang="en-US" dirty="0"/>
+              <a:t>Added </a:t>
+            </a:r>
+            <a:r>
+              <a:rPr lang="en-US" dirty="0" err="1"/>
+              <a:t>typeRoad</a:t>
+            </a:r>
+            <a:r>
+              <a:rPr lang="en-US" dirty="0"/>
+              <a:t> element</a:t>
+            </a:r>
+          </a:p>
+          <a:p>
+            <a:pPr marL="285750" indent="-285750">
+              <a:buFontTx/>
+              <a:buChar char="-"/>
+            </a:pPr>
+            <a:r>
+              <a:rPr lang="en-US" dirty="0"/>
+              <a:t>Added </a:t>
+            </a:r>
+            <a:r>
+              <a:rPr lang="en-US" dirty="0" err="1"/>
+              <a:t>speedLimit</a:t>
+            </a:r>
+            <a:r>
+              <a:rPr lang="en-US" dirty="0"/>
+              <a:t> element</a:t>
+            </a:r>
+          </a:p>
+          <a:p>
+            <a:pPr marL="285750" indent="-285750">
+              <a:buFontTx/>
+              <a:buChar char="-"/>
+            </a:pPr>
+            <a:r>
+              <a:rPr lang="en-US" dirty="0"/>
+              <a:t>Added </a:t>
+            </a:r>
+            <a:r>
+              <a:rPr lang="en-US" dirty="0" err="1"/>
+              <a:t>unitLimit</a:t>
+            </a:r>
+            <a:r>
+              <a:rPr lang="en-US" dirty="0"/>
+              <a:t> element</a:t>
+            </a:r>
+          </a:p>
+          <a:p>
+            <a:pPr marL="285750" indent="-285750">
+              <a:buFontTx/>
+              <a:buChar char="-"/>
+            </a:pPr>
+            <a:r>
+              <a:rPr lang="en-US" dirty="0"/>
+              <a:t>Removed the s elements from the road tag</a:t>
+            </a:r>
+          </a:p>
+          <a:p>
+            <a:pPr marL="285750" indent="-285750">
+              <a:buFontTx/>
+              <a:buChar char="-"/>
+            </a:pPr>
+            <a:r>
+              <a:rPr lang="en-US" dirty="0"/>
+              <a:t>Changed road id to 0 </a:t>
+            </a:r>
+          </a:p>
+          <a:p>
+            <a:pPr marL="285750" indent="-285750">
+              <a:buFontTx/>
+              <a:buChar char="-"/>
+            </a:pPr>
+            <a:r>
+              <a:rPr lang="en-US" dirty="0"/>
+              <a:t>Use the name Road 0 for the road name</a:t>
+            </a:r>
+          </a:p>
+          <a:p>
+            <a:pPr marL="285750" indent="-285750">
+              <a:buFontTx/>
+              <a:buChar char="-"/>
+            </a:pPr>
+            <a:r>
+              <a:rPr lang="en-US" dirty="0"/>
+              <a:t>Added junction elements and put value of -1 </a:t>
+            </a:r>
+          </a:p>
+        </p:txBody>
+      </p:sp>
+    </p:spTree>
+    <p:extLst>
+      <p:ext uri="{BB962C8B-B14F-4D97-AF65-F5344CB8AC3E}">
+        <p14:creationId xmlns:p14="http://schemas.microsoft.com/office/powerpoint/2010/main" val="1845159410"/>
+      </p:ext>
+    </p:extLst>
+  </p:cSld>
+  <p:clrMapOvr>
+    <a:masterClrMapping/>
+  </p:clrMapOvr>
+</p:sld>
+</file>
+
+<file path=ppt/slides/slide6.xml><?xml version="1.0" encoding="utf-8"?>
+<p:sld xmlns:a="http://schemas.openxmlformats.org/drawingml/2006/main" xmlns:r="http://schemas.openxmlformats.org/officeDocument/2006/relationships" xmlns:p="http://schemas.openxmlformats.org/presentationml/2006/main">
+  <p:cSld>
+    <p:spTree>
+      <p:nvGrpSpPr>
+        <p:cNvPr id="1" name=""/>
+        <p:cNvGrpSpPr/>
+        <p:nvPr/>
+      </p:nvGrpSpPr>
+      <p:grpSpPr>
+        <a:xfrm>
+          <a:off x="0" y="0"/>
+          <a:ext cx="0" cy="0"/>
+          <a:chOff x="0" y="0"/>
+          <a:chExt cx="0" cy="0"/>
+        </a:xfrm>
+      </p:grpSpPr>
+      <p:pic>
+        <p:nvPicPr>
+          <p:cNvPr id="5" name="Picture 4" descr="Text&#10;&#10;Description automatically generated">
+            <a:extLst>
+              <a:ext uri="{FF2B5EF4-FFF2-40B4-BE49-F238E27FC236}">
+                <a16:creationId xmlns:a16="http://schemas.microsoft.com/office/drawing/2014/main" id="{C121F5AB-1FBD-3329-C7A0-4397D6CAE8D2}"/>
+              </a:ext>
+            </a:extLst>
+          </p:cNvPr>
+          <p:cNvPicPr>
+            <a:picLocks noChangeAspect="1"/>
+          </p:cNvPicPr>
+          <p:nvPr/>
+        </p:nvPicPr>
+        <p:blipFill>
+          <a:blip r:embed="rId2"/>
+          <a:stretch>
+            <a:fillRect/>
+          </a:stretch>
+        </p:blipFill>
+        <p:spPr>
+          <a:xfrm>
+            <a:off x="2343150" y="735012"/>
+            <a:ext cx="7505700" cy="2387600"/>
+          </a:xfrm>
+          <a:prstGeom prst="rect">
+            <a:avLst/>
+          </a:prstGeom>
+        </p:spPr>
+      </p:pic>
+      <p:sp>
+        <p:nvSpPr>
+          <p:cNvPr id="6" name="TextBox 5">
+            <a:extLst>
+              <a:ext uri="{FF2B5EF4-FFF2-40B4-BE49-F238E27FC236}">
+                <a16:creationId xmlns:a16="http://schemas.microsoft.com/office/drawing/2014/main" id="{5742AAE0-5A36-8E62-052E-CFE11AB1386B}"/>
+              </a:ext>
+            </a:extLst>
+          </p:cNvPr>
+          <p:cNvSpPr txBox="1"/>
+          <p:nvPr/>
+        </p:nvSpPr>
+        <p:spPr>
+          <a:xfrm>
+            <a:off x="2343150" y="3735389"/>
+            <a:ext cx="2982035" cy="646331"/>
+          </a:xfrm>
+          <a:prstGeom prst="rect">
+            <a:avLst/>
+          </a:prstGeom>
+          <a:noFill/>
+        </p:spPr>
+        <p:txBody>
+          <a:bodyPr wrap="none" rtlCol="0">
+            <a:spAutoFit/>
+          </a:bodyPr>
+          <a:lstStyle/>
+          <a:p>
+            <a:pPr marL="285750" indent="-285750">
+              <a:buFontTx/>
+              <a:buChar char="-"/>
+            </a:pPr>
+            <a:r>
+              <a:rPr lang="en-US" dirty="0"/>
+              <a:t>Added </a:t>
+            </a:r>
+            <a:r>
+              <a:rPr lang="en-US" dirty="0" err="1"/>
+              <a:t>elevationProfile</a:t>
+            </a:r>
+            <a:r>
+              <a:rPr lang="en-US" dirty="0"/>
+              <a:t> tag</a:t>
+            </a:r>
+          </a:p>
+          <a:p>
+            <a:pPr marL="285750" indent="-285750">
+              <a:buFontTx/>
+              <a:buChar char="-"/>
+            </a:pPr>
+            <a:r>
+              <a:rPr lang="en-US" dirty="0"/>
+              <a:t>Added </a:t>
+            </a:r>
+            <a:r>
+              <a:rPr lang="en-US" dirty="0" err="1"/>
+              <a:t>lateralProfile</a:t>
+            </a:r>
+            <a:r>
+              <a:rPr lang="en-US" dirty="0"/>
+              <a:t> tag</a:t>
+            </a:r>
+          </a:p>
+        </p:txBody>
+      </p:sp>
+    </p:spTree>
+    <p:extLst>
+      <p:ext uri="{BB962C8B-B14F-4D97-AF65-F5344CB8AC3E}">
+        <p14:creationId xmlns:p14="http://schemas.microsoft.com/office/powerpoint/2010/main" val="239784699"/>
+      </p:ext>
+    </p:extLst>
+  </p:cSld>
+  <p:clrMapOvr>
+    <a:masterClrMapping/>
+  </p:clrMapOvr>
+</p:sld>
+</file>
+
+<file path=ppt/slides/slide7.xml><?xml version="1.0" encoding="utf-8"?>
+<p:sld xmlns:a="http://schemas.openxmlformats.org/drawingml/2006/main" xmlns:r="http://schemas.openxmlformats.org/officeDocument/2006/relationships" xmlns:p="http://schemas.openxmlformats.org/presentationml/2006/main">
+  <p:cSld>
+    <p:spTree>
+      <p:nvGrpSpPr>
+        <p:cNvPr id="1" name=""/>
+        <p:cNvGrpSpPr/>
+        <p:nvPr/>
+      </p:nvGrpSpPr>
+      <p:grpSpPr>
+        <a:xfrm>
+          <a:off x="0" y="0"/>
+          <a:ext cx="0" cy="0"/>
+          <a:chOff x="0" y="0"/>
+          <a:chExt cx="0" cy="0"/>
+        </a:xfrm>
+      </p:grpSpPr>
+      <p:pic>
+        <p:nvPicPr>
+          <p:cNvPr id="5" name="Picture 4">
+            <a:extLst>
+              <a:ext uri="{FF2B5EF4-FFF2-40B4-BE49-F238E27FC236}">
+                <a16:creationId xmlns:a16="http://schemas.microsoft.com/office/drawing/2014/main" id="{C89EFDA5-36FA-2FFA-F0CA-E7068C5A414D}"/>
+              </a:ext>
+            </a:extLst>
+          </p:cNvPr>
+          <p:cNvPicPr>
+            <a:picLocks noChangeAspect="1"/>
+          </p:cNvPicPr>
+          <p:nvPr/>
+        </p:nvPicPr>
+        <p:blipFill>
+          <a:blip r:embed="rId2"/>
+          <a:stretch>
+            <a:fillRect/>
+          </a:stretch>
+        </p:blipFill>
+        <p:spPr>
+          <a:xfrm>
+            <a:off x="2324100" y="908050"/>
+            <a:ext cx="7543800" cy="812800"/>
+          </a:xfrm>
+          <a:prstGeom prst="rect">
+            <a:avLst/>
+          </a:prstGeom>
+        </p:spPr>
+      </p:pic>
+      <p:sp>
+        <p:nvSpPr>
+          <p:cNvPr id="6" name="TextBox 5">
+            <a:extLst>
+              <a:ext uri="{FF2B5EF4-FFF2-40B4-BE49-F238E27FC236}">
+                <a16:creationId xmlns:a16="http://schemas.microsoft.com/office/drawing/2014/main" id="{FCDC6F0B-591F-1C15-75BD-193C1EC94A7D}"/>
+              </a:ext>
+            </a:extLst>
+          </p:cNvPr>
+          <p:cNvSpPr txBox="1"/>
+          <p:nvPr/>
+        </p:nvSpPr>
+        <p:spPr>
+          <a:xfrm>
+            <a:off x="728663" y="2782669"/>
+            <a:ext cx="10175991" cy="646331"/>
+          </a:xfrm>
+          <a:prstGeom prst="rect">
+            <a:avLst/>
+          </a:prstGeom>
+          <a:noFill/>
+        </p:spPr>
+        <p:txBody>
+          <a:bodyPr wrap="none" rtlCol="0">
+            <a:spAutoFit/>
+          </a:bodyPr>
+          <a:lstStyle/>
+          <a:p>
+            <a:pPr marL="285750" indent="-285750">
+              <a:buFontTx/>
+              <a:buChar char="-"/>
+            </a:pPr>
+            <a:r>
+              <a:rPr lang="en-US" dirty="0"/>
+              <a:t>Added user input </a:t>
+            </a:r>
+            <a:r>
+              <a:rPr lang="en-US" dirty="0" err="1"/>
+              <a:t>singleSide</a:t>
+            </a:r>
+            <a:r>
+              <a:rPr lang="en-US" dirty="0"/>
+              <a:t>. The program will ask user for </a:t>
+            </a:r>
+            <a:r>
+              <a:rPr lang="en-US" dirty="0" err="1"/>
+              <a:t>singleSide</a:t>
+            </a:r>
+            <a:r>
+              <a:rPr lang="en-US" dirty="0"/>
+              <a:t> and the user will type false or true</a:t>
+            </a:r>
+          </a:p>
+          <a:p>
+            <a:pPr marL="285750" indent="-285750">
+              <a:buFontTx/>
+              <a:buChar char="-"/>
+            </a:pPr>
+            <a:r>
+              <a:rPr lang="en-US" dirty="0"/>
+              <a:t>Then we put that value into </a:t>
+            </a:r>
+            <a:r>
+              <a:rPr lang="en-US" dirty="0" err="1"/>
+              <a:t>singleSide</a:t>
+            </a:r>
+            <a:r>
+              <a:rPr lang="en-US" dirty="0"/>
+              <a:t> element in </a:t>
+            </a:r>
+            <a:r>
+              <a:rPr lang="en-US" dirty="0" err="1"/>
+              <a:t>laneSection</a:t>
+            </a:r>
+            <a:r>
+              <a:rPr lang="en-US" dirty="0"/>
+              <a:t> tag</a:t>
+            </a:r>
+          </a:p>
+        </p:txBody>
+      </p:sp>
+    </p:spTree>
+    <p:extLst>
+      <p:ext uri="{BB962C8B-B14F-4D97-AF65-F5344CB8AC3E}">
+        <p14:creationId xmlns:p14="http://schemas.microsoft.com/office/powerpoint/2010/main" val="1477205317"/>
+      </p:ext>
+    </p:extLst>
+  </p:cSld>
+  <p:clrMapOvr>
+    <a:masterClrMapping/>
+  </p:clrMapOvr>
+</p:sld>
+</file>
+
+<file path=ppt/slides/slide8.xml><?xml version="1.0" encoding="utf-8"?>
+<p:sld xmlns:a="http://schemas.openxmlformats.org/drawingml/2006/main" xmlns:r="http://schemas.openxmlformats.org/officeDocument/2006/relationships" xmlns:p="http://schemas.openxmlformats.org/presentationml/2006/main">
+  <p:cSld>
+    <p:spTree>
+      <p:nvGrpSpPr>
+        <p:cNvPr id="1" name=""/>
+        <p:cNvGrpSpPr/>
+        <p:nvPr/>
+      </p:nvGrpSpPr>
+      <p:grpSpPr>
+        <a:xfrm>
+          <a:off x="0" y="0"/>
+          <a:ext cx="0" cy="0"/>
+          <a:chOff x="0" y="0"/>
+          <a:chExt cx="0" cy="0"/>
+        </a:xfrm>
+      </p:grpSpPr>
+      <p:pic>
+        <p:nvPicPr>
+          <p:cNvPr id="5" name="Picture 4">
+            <a:extLst>
+              <a:ext uri="{FF2B5EF4-FFF2-40B4-BE49-F238E27FC236}">
+                <a16:creationId xmlns:a16="http://schemas.microsoft.com/office/drawing/2014/main" id="{7EAC4CB3-8C49-17C3-9679-E13BA51D9266}"/>
+              </a:ext>
+            </a:extLst>
+          </p:cNvPr>
+          <p:cNvPicPr>
+            <a:picLocks noChangeAspect="1"/>
+          </p:cNvPicPr>
+          <p:nvPr/>
+        </p:nvPicPr>
+        <p:blipFill>
+          <a:blip r:embed="rId2"/>
+          <a:stretch>
+            <a:fillRect/>
+          </a:stretch>
+        </p:blipFill>
+        <p:spPr>
+          <a:xfrm>
+            <a:off x="501650" y="857250"/>
+            <a:ext cx="11188700" cy="1143000"/>
+          </a:xfrm>
+          <a:prstGeom prst="rect">
+            <a:avLst/>
+          </a:prstGeom>
+        </p:spPr>
+      </p:pic>
+      <p:sp>
+        <p:nvSpPr>
+          <p:cNvPr id="6" name="TextBox 5">
+            <a:extLst>
+              <a:ext uri="{FF2B5EF4-FFF2-40B4-BE49-F238E27FC236}">
+                <a16:creationId xmlns:a16="http://schemas.microsoft.com/office/drawing/2014/main" id="{8548DD7F-3685-FF77-9994-5D47EE07E220}"/>
+              </a:ext>
+            </a:extLst>
+          </p:cNvPr>
+          <p:cNvSpPr txBox="1"/>
+          <p:nvPr/>
+        </p:nvSpPr>
+        <p:spPr>
+          <a:xfrm>
+            <a:off x="571500" y="2643188"/>
+            <a:ext cx="11755334" cy="1477328"/>
+          </a:xfrm>
+          <a:prstGeom prst="rect">
+            <a:avLst/>
+          </a:prstGeom>
+          <a:noFill/>
+        </p:spPr>
+        <p:txBody>
+          <a:bodyPr wrap="none" rtlCol="0">
+            <a:spAutoFit/>
+          </a:bodyPr>
+          <a:lstStyle/>
+          <a:p>
+            <a:pPr marL="285750" indent="-285750">
+              <a:buFontTx/>
+              <a:buChar char="-"/>
+            </a:pPr>
+            <a:r>
+              <a:rPr lang="en-US" dirty="0"/>
+              <a:t>Modified the lane info to ask more information from user. The information includes </a:t>
+            </a:r>
+            <a:r>
+              <a:rPr lang="en-US" dirty="0" err="1"/>
+              <a:t>a,b,c,d,type,level,color,laneChange</a:t>
+            </a:r>
+            <a:endParaRPr lang="en-US" dirty="0"/>
+          </a:p>
+          <a:p>
+            <a:r>
+              <a:rPr lang="en-US" dirty="0"/>
+              <a:t>	and </a:t>
+            </a:r>
+            <a:r>
+              <a:rPr lang="en-US" dirty="0" err="1"/>
+              <a:t>travelDir</a:t>
+            </a:r>
+            <a:endParaRPr lang="en-US" dirty="0"/>
+          </a:p>
+          <a:p>
+            <a:pPr marL="285750" indent="-285750">
+              <a:buFontTx/>
+              <a:buChar char="-"/>
+            </a:pPr>
+            <a:r>
+              <a:rPr lang="en-US" dirty="0"/>
+              <a:t>The same goes for the right lane but the difference is left lane will go from shoulder to driving and right lane will go from</a:t>
+            </a:r>
+          </a:p>
+          <a:p>
+            <a:r>
+              <a:rPr lang="en-US" dirty="0"/>
+              <a:t>	driving to shoulder</a:t>
+            </a:r>
+          </a:p>
+          <a:p>
+            <a:r>
+              <a:rPr lang="en-US" dirty="0"/>
+              <a:t>	</a:t>
+            </a:r>
+          </a:p>
+        </p:txBody>
+      </p:sp>
+    </p:spTree>
+    <p:extLst>
+      <p:ext uri="{BB962C8B-B14F-4D97-AF65-F5344CB8AC3E}">
+        <p14:creationId xmlns:p14="http://schemas.microsoft.com/office/powerpoint/2010/main" val="1354506127"/>
+      </p:ext>
+    </p:extLst>
+  </p:cSld>
+  <p:clrMapOvr>
+    <a:masterClrMapping/>
+  </p:clrMapOvr>
+</p:sld>
+</file>
+
+<file path=ppt/slides/slide9.xml><?xml version="1.0" encoding="utf-8"?>
+<p:sld xmlns:a="http://schemas.openxmlformats.org/drawingml/2006/main" xmlns:r="http://schemas.openxmlformats.org/officeDocument/2006/relationships" xmlns:p="http://schemas.openxmlformats.org/presentationml/2006/main">
+  <p:cSld>
+    <p:spTree>
+      <p:nvGrpSpPr>
+        <p:cNvPr id="1" name=""/>
+        <p:cNvGrpSpPr/>
+        <p:nvPr/>
+      </p:nvGrpSpPr>
+      <p:grpSpPr>
+        <a:xfrm>
+          <a:off x="0" y="0"/>
+          <a:ext cx="0" cy="0"/>
+          <a:chOff x="0" y="0"/>
+          <a:chExt cx="0" cy="0"/>
+        </a:xfrm>
+      </p:grpSpPr>
+      <p:pic>
+        <p:nvPicPr>
+          <p:cNvPr id="5" name="Picture 4" descr="A screenshot of a computer&#10;&#10;Description automatically generated with medium confidence">
+            <a:extLst>
+              <a:ext uri="{FF2B5EF4-FFF2-40B4-BE49-F238E27FC236}">
+                <a16:creationId xmlns:a16="http://schemas.microsoft.com/office/drawing/2014/main" id="{DAA0941A-C8E9-A008-FBFD-0EAA888B7B9E}"/>
+              </a:ext>
+            </a:extLst>
+          </p:cNvPr>
+          <p:cNvPicPr>
+            <a:picLocks noChangeAspect="1"/>
+          </p:cNvPicPr>
+          <p:nvPr/>
+        </p:nvPicPr>
+        <p:blipFill>
+          <a:blip r:embed="rId2"/>
+          <a:stretch>
+            <a:fillRect/>
+          </a:stretch>
+        </p:blipFill>
+        <p:spPr>
+          <a:xfrm>
+            <a:off x="31750" y="0"/>
+            <a:ext cx="12128500" cy="3873500"/>
+          </a:xfrm>
+          <a:prstGeom prst="rect">
+            <a:avLst/>
+          </a:prstGeom>
+        </p:spPr>
+      </p:pic>
+      <p:sp>
+        <p:nvSpPr>
+          <p:cNvPr id="6" name="TextBox 5">
+            <a:extLst>
+              <a:ext uri="{FF2B5EF4-FFF2-40B4-BE49-F238E27FC236}">
+                <a16:creationId xmlns:a16="http://schemas.microsoft.com/office/drawing/2014/main" id="{A7B7C3DD-E6CC-4CF0-EC0D-F63F5B8A7C4B}"/>
+              </a:ext>
+            </a:extLst>
+          </p:cNvPr>
+          <p:cNvSpPr txBox="1"/>
+          <p:nvPr/>
+        </p:nvSpPr>
+        <p:spPr>
+          <a:xfrm>
+            <a:off x="500063" y="4443413"/>
+            <a:ext cx="9683677" cy="923330"/>
+          </a:xfrm>
+          <a:prstGeom prst="rect">
+            <a:avLst/>
+          </a:prstGeom>
+          <a:noFill/>
+        </p:spPr>
+        <p:txBody>
+          <a:bodyPr wrap="none" rtlCol="0">
+            <a:spAutoFit/>
+          </a:bodyPr>
+          <a:lstStyle/>
+          <a:p>
+            <a:pPr marL="285750" indent="-285750">
+              <a:buFontTx/>
+              <a:buChar char="-"/>
+            </a:pPr>
+            <a:r>
+              <a:rPr lang="en-US" dirty="0"/>
+              <a:t>Added more tags: level, </a:t>
+            </a:r>
+            <a:r>
+              <a:rPr lang="en-US" dirty="0" err="1"/>
+              <a:t>roadMark</a:t>
+            </a:r>
+            <a:r>
+              <a:rPr lang="en-US" dirty="0"/>
+              <a:t>, speed, and </a:t>
+            </a:r>
+            <a:r>
+              <a:rPr lang="en-US" dirty="0" err="1"/>
+              <a:t>userData</a:t>
+            </a:r>
+            <a:endParaRPr lang="en-US" dirty="0"/>
+          </a:p>
+          <a:p>
+            <a:pPr marL="285750" indent="-285750">
+              <a:buFontTx/>
+              <a:buChar char="-"/>
+            </a:pPr>
+            <a:r>
+              <a:rPr lang="en-US" dirty="0"/>
+              <a:t>If else statement for separating driving and other. Driving lane has solid type and with is difference</a:t>
+            </a:r>
+          </a:p>
+          <a:p>
+            <a:pPr marL="285750" indent="-285750">
+              <a:buFontTx/>
+              <a:buChar char="-"/>
+            </a:pPr>
+            <a:endParaRPr lang="en-US" dirty="0"/>
+          </a:p>
+        </p:txBody>
+      </p:sp>
+    </p:spTree>
+    <p:extLst>
+      <p:ext uri="{BB962C8B-B14F-4D97-AF65-F5344CB8AC3E}">
+        <p14:creationId xmlns:p14="http://schemas.microsoft.com/office/powerpoint/2010/main" val="105205021"/>
       </p:ext>
     </p:extLst>
   </p:cSld>

</xml_diff>